<commit_message>
ppt modified, script.md added
</commit_message>
<xml_diff>
--- a/Raman_Final Presentation.pptx
+++ b/Raman_Final Presentation.pptx
@@ -15,10 +15,10 @@
     <p:sldId id="313" r:id="rId6"/>
     <p:sldId id="332" r:id="rId7"/>
     <p:sldId id="329" r:id="rId8"/>
-    <p:sldId id="330" r:id="rId9"/>
-    <p:sldId id="319" r:id="rId10"/>
-    <p:sldId id="320" r:id="rId11"/>
-    <p:sldId id="331" r:id="rId12"/>
+    <p:sldId id="319" r:id="rId9"/>
+    <p:sldId id="330" r:id="rId10"/>
+    <p:sldId id="331" r:id="rId11"/>
+    <p:sldId id="320" r:id="rId12"/>
     <p:sldId id="321" r:id="rId13"/>
     <p:sldId id="327" r:id="rId14"/>
     <p:sldId id="293" r:id="rId15"/>
@@ -222,7 +222,7 @@
           <a:p>
             <a:fld id="{B846FA5B-67FB-4835-A48C-92E0EAE684C7}" type="datetimeFigureOut">
               <a:rPr lang="ko-KR" altLang="en-US" smtClean="0"/>
-              <a:t>2022-11-27</a:t>
+              <a:t>2022-11-29</a:t>
             </a:fld>
             <a:endParaRPr lang="ko-KR" altLang="en-US"/>
           </a:p>
@@ -4171,42 +4171,6 @@
           </a:p>
         </p:txBody>
       </p:sp>
-      <p:pic>
-        <p:nvPicPr>
-          <p:cNvPr id="9" name="그림 8">
-            <a:extLst>
-              <a:ext uri="{FF2B5EF4-FFF2-40B4-BE49-F238E27FC236}">
-                <a16:creationId xmlns:a16="http://schemas.microsoft.com/office/drawing/2014/main" id="{46F2AD97-B239-4A6F-81EF-BE8785D2FB14}"/>
-              </a:ext>
-            </a:extLst>
-          </p:cNvPr>
-          <p:cNvPicPr>
-            <a:picLocks noChangeAspect="1"/>
-          </p:cNvPicPr>
-          <p:nvPr/>
-        </p:nvPicPr>
-        <p:blipFill>
-          <a:blip r:embed="rId4">
-            <a:extLst>
-              <a:ext uri="{28A0092B-C50C-407E-A947-70E740481C1C}">
-                <a14:useLocalDpi xmlns:a14="http://schemas.microsoft.com/office/drawing/2010/main" val="0"/>
-              </a:ext>
-            </a:extLst>
-          </a:blip>
-          <a:stretch>
-            <a:fillRect/>
-          </a:stretch>
-        </p:blipFill>
-        <p:spPr>
-          <a:xfrm>
-            <a:off x="1" y="6741368"/>
-            <a:ext cx="87301" cy="116632"/>
-          </a:xfrm>
-          <a:prstGeom prst="rect">
-            <a:avLst/>
-          </a:prstGeom>
-        </p:spPr>
-      </p:pic>
       <p:sp>
         <p:nvSpPr>
           <p:cNvPr id="10" name="TextBox 9">
@@ -4280,6 +4244,124 @@
 </file>
 
 <file path=ppt/slides/slide10.xml><?xml version="1.0" encoding="utf-8"?>
+<p:sld xmlns:a="http://schemas.openxmlformats.org/drawingml/2006/main" xmlns:r="http://schemas.openxmlformats.org/officeDocument/2006/relationships" xmlns:p="http://schemas.openxmlformats.org/presentationml/2006/main">
+  <p:cSld>
+    <p:spTree>
+      <p:nvGrpSpPr>
+        <p:cNvPr id="1" name=""/>
+        <p:cNvGrpSpPr/>
+        <p:nvPr/>
+      </p:nvGrpSpPr>
+      <p:grpSpPr>
+        <a:xfrm>
+          <a:off x="0" y="0"/>
+          <a:ext cx="0" cy="0"/>
+          <a:chOff x="0" y="0"/>
+          <a:chExt cx="0" cy="0"/>
+        </a:xfrm>
+      </p:grpSpPr>
+      <p:sp>
+        <p:nvSpPr>
+          <p:cNvPr id="4" name="TextBox 3">
+            <a:extLst>
+              <a:ext uri="{FF2B5EF4-FFF2-40B4-BE49-F238E27FC236}">
+                <a16:creationId xmlns:a16="http://schemas.microsoft.com/office/drawing/2014/main" id="{8A05AD63-D546-1C08-A20F-2F18332B8279}"/>
+              </a:ext>
+            </a:extLst>
+          </p:cNvPr>
+          <p:cNvSpPr txBox="1"/>
+          <p:nvPr/>
+        </p:nvSpPr>
+        <p:spPr>
+          <a:xfrm>
+            <a:off x="1631504" y="764704"/>
+            <a:ext cx="10053718" cy="677108"/>
+          </a:xfrm>
+          <a:prstGeom prst="rect">
+            <a:avLst/>
+          </a:prstGeom>
+          <a:noFill/>
+        </p:spPr>
+        <p:txBody>
+          <a:bodyPr wrap="square" rtlCol="0">
+            <a:spAutoFit/>
+          </a:bodyPr>
+          <a:lstStyle/>
+          <a:p>
+            <a:r>
+              <a:rPr lang="en-US" altLang="ko-KR" sz="3800" dirty="0">
+                <a:solidFill>
+                  <a:srgbClr val="072A60"/>
+                </a:solidFill>
+                <a:latin typeface="Garamond" panose="02020404030301010803" pitchFamily="18" charset="0"/>
+              </a:rPr>
+              <a:t>Ti2CTx – Experiment Result</a:t>
+            </a:r>
+          </a:p>
+        </p:txBody>
+      </p:sp>
+      <p:pic>
+        <p:nvPicPr>
+          <p:cNvPr id="5" name="그림 4">
+            <a:extLst>
+              <a:ext uri="{FF2B5EF4-FFF2-40B4-BE49-F238E27FC236}">
+                <a16:creationId xmlns:a16="http://schemas.microsoft.com/office/drawing/2014/main" id="{87654996-BC1E-17E9-4086-E393E7268F39}"/>
+              </a:ext>
+            </a:extLst>
+          </p:cNvPr>
+          <p:cNvPicPr>
+            <a:picLocks noChangeAspect="1"/>
+          </p:cNvPicPr>
+          <p:nvPr/>
+        </p:nvPicPr>
+        <p:blipFill>
+          <a:blip r:embed="rId2">
+            <a:extLst>
+              <a:ext uri="{28A0092B-C50C-407E-A947-70E740481C1C}">
+                <a14:useLocalDpi xmlns:a14="http://schemas.microsoft.com/office/drawing/2010/main" val="0"/>
+              </a:ext>
+            </a:extLst>
+          </a:blip>
+          <a:stretch>
+            <a:fillRect/>
+          </a:stretch>
+        </p:blipFill>
+        <p:spPr>
+          <a:xfrm>
+            <a:off x="1055440" y="1556792"/>
+            <a:ext cx="6984776" cy="4742550"/>
+          </a:xfrm>
+          <a:prstGeom prst="rect">
+            <a:avLst/>
+          </a:prstGeom>
+        </p:spPr>
+      </p:pic>
+    </p:spTree>
+    <p:extLst>
+      <p:ext uri="{BB962C8B-B14F-4D97-AF65-F5344CB8AC3E}">
+        <p14:creationId xmlns:p14="http://schemas.microsoft.com/office/powerpoint/2010/main" val="3847048166"/>
+      </p:ext>
+    </p:extLst>
+  </p:cSld>
+  <p:clrMapOvr>
+    <a:masterClrMapping/>
+  </p:clrMapOvr>
+  <mc:AlternateContent xmlns:mc="http://schemas.openxmlformats.org/markup-compatibility/2006" xmlns:p14="http://schemas.microsoft.com/office/powerpoint/2010/main">
+    <mc:Choice Requires="p14">
+      <p:transition spd="med" p14:dur="700">
+        <p:fade/>
+      </p:transition>
+    </mc:Choice>
+    <mc:Fallback xmlns="">
+      <p:transition spd="med">
+        <p:fade/>
+      </p:transition>
+    </mc:Fallback>
+  </mc:AlternateContent>
+</p:sld>
+</file>
+
+<file path=ppt/slides/slide11.xml><?xml version="1.0" encoding="utf-8"?>
 <p:sld xmlns:a="http://schemas.openxmlformats.org/drawingml/2006/main" xmlns:r="http://schemas.openxmlformats.org/officeDocument/2006/relationships" xmlns:p="http://schemas.openxmlformats.org/presentationml/2006/main">
   <p:cSld>
     <p:spTree>
@@ -4603,8 +4685,8 @@
           </p:txBody>
         </p:sp>
       </p:grpSp>
-      <mc:AlternateContent xmlns:mc="http://schemas.openxmlformats.org/markup-compatibility/2006">
-        <mc:Choice xmlns:a14="http://schemas.microsoft.com/office/drawing/2010/main" Requires="a14">
+      <mc:AlternateContent xmlns:mc="http://schemas.openxmlformats.org/markup-compatibility/2006" xmlns:a14="http://schemas.microsoft.com/office/drawing/2010/main">
+        <mc:Choice Requires="a14">
           <p:sp>
             <p:nvSpPr>
               <p:cNvPr id="5" name="TextBox 4">
@@ -4661,7 +4743,7 @@
                     <m:sSup>
                       <m:sSupPr>
                         <m:ctrlPr>
-                          <a:rPr lang="en-US" altLang="ko-KR" sz="2200">
+                          <a:rPr lang="en-US" altLang="ko-KR" sz="2200" i="1">
                             <a:solidFill>
                               <a:srgbClr val="072A60"/>
                             </a:solidFill>
@@ -4721,7 +4803,7 @@
                     <m:sSup>
                       <m:sSupPr>
                         <m:ctrlPr>
-                          <a:rPr lang="en-US" altLang="ko-KR" sz="2200">
+                          <a:rPr lang="en-US" altLang="ko-KR" sz="2200" i="1">
                             <a:solidFill>
                               <a:srgbClr val="072A60"/>
                             </a:solidFill>
@@ -5117,7 +5199,7 @@
                     <m:sSup>
                       <m:sSupPr>
                         <m:ctrlPr>
-                          <a:rPr lang="en-US" altLang="ko-KR" sz="2200" smtClean="0">
+                          <a:rPr lang="en-US" altLang="ko-KR" sz="2200" i="1" smtClean="0">
                             <a:solidFill>
                               <a:srgbClr val="072A60"/>
                             </a:solidFill>
@@ -5194,7 +5276,7 @@
             </p:txBody>
           </p:sp>
         </mc:Choice>
-        <mc:Fallback>
+        <mc:Fallback xmlns="">
           <p:sp>
             <p:nvSpPr>
               <p:cNvPr id="5" name="TextBox 4">
@@ -5264,124 +5346,6 @@
 </p:sld>
 </file>
 
-<file path=ppt/slides/slide11.xml><?xml version="1.0" encoding="utf-8"?>
-<p:sld xmlns:a="http://schemas.openxmlformats.org/drawingml/2006/main" xmlns:r="http://schemas.openxmlformats.org/officeDocument/2006/relationships" xmlns:p="http://schemas.openxmlformats.org/presentationml/2006/main">
-  <p:cSld>
-    <p:spTree>
-      <p:nvGrpSpPr>
-        <p:cNvPr id="1" name=""/>
-        <p:cNvGrpSpPr/>
-        <p:nvPr/>
-      </p:nvGrpSpPr>
-      <p:grpSpPr>
-        <a:xfrm>
-          <a:off x="0" y="0"/>
-          <a:ext cx="0" cy="0"/>
-          <a:chOff x="0" y="0"/>
-          <a:chExt cx="0" cy="0"/>
-        </a:xfrm>
-      </p:grpSpPr>
-      <p:sp>
-        <p:nvSpPr>
-          <p:cNvPr id="4" name="TextBox 3">
-            <a:extLst>
-              <a:ext uri="{FF2B5EF4-FFF2-40B4-BE49-F238E27FC236}">
-                <a16:creationId xmlns:a16="http://schemas.microsoft.com/office/drawing/2014/main" id="{8A05AD63-D546-1C08-A20F-2F18332B8279}"/>
-              </a:ext>
-            </a:extLst>
-          </p:cNvPr>
-          <p:cNvSpPr txBox="1"/>
-          <p:nvPr/>
-        </p:nvSpPr>
-        <p:spPr>
-          <a:xfrm>
-            <a:off x="1631504" y="764704"/>
-            <a:ext cx="10053718" cy="677108"/>
-          </a:xfrm>
-          <a:prstGeom prst="rect">
-            <a:avLst/>
-          </a:prstGeom>
-          <a:noFill/>
-        </p:spPr>
-        <p:txBody>
-          <a:bodyPr wrap="square" rtlCol="0">
-            <a:spAutoFit/>
-          </a:bodyPr>
-          <a:lstStyle/>
-          <a:p>
-            <a:r>
-              <a:rPr lang="en-US" altLang="ko-KR" sz="3800" dirty="0">
-                <a:solidFill>
-                  <a:srgbClr val="072A60"/>
-                </a:solidFill>
-                <a:latin typeface="Garamond" panose="02020404030301010803" pitchFamily="18" charset="0"/>
-              </a:rPr>
-              <a:t>Ti2CTx – Experiment Result</a:t>
-            </a:r>
-          </a:p>
-        </p:txBody>
-      </p:sp>
-      <p:pic>
-        <p:nvPicPr>
-          <p:cNvPr id="5" name="그림 4">
-            <a:extLst>
-              <a:ext uri="{FF2B5EF4-FFF2-40B4-BE49-F238E27FC236}">
-                <a16:creationId xmlns:a16="http://schemas.microsoft.com/office/drawing/2014/main" id="{87654996-BC1E-17E9-4086-E393E7268F39}"/>
-              </a:ext>
-            </a:extLst>
-          </p:cNvPr>
-          <p:cNvPicPr>
-            <a:picLocks noChangeAspect="1"/>
-          </p:cNvPicPr>
-          <p:nvPr/>
-        </p:nvPicPr>
-        <p:blipFill>
-          <a:blip r:embed="rId2">
-            <a:extLst>
-              <a:ext uri="{28A0092B-C50C-407E-A947-70E740481C1C}">
-                <a14:useLocalDpi xmlns:a14="http://schemas.microsoft.com/office/drawing/2010/main" val="0"/>
-              </a:ext>
-            </a:extLst>
-          </a:blip>
-          <a:stretch>
-            <a:fillRect/>
-          </a:stretch>
-        </p:blipFill>
-        <p:spPr>
-          <a:xfrm>
-            <a:off x="1055440" y="1556792"/>
-            <a:ext cx="6984776" cy="4742550"/>
-          </a:xfrm>
-          <a:prstGeom prst="rect">
-            <a:avLst/>
-          </a:prstGeom>
-        </p:spPr>
-      </p:pic>
-    </p:spTree>
-    <p:extLst>
-      <p:ext uri="{BB962C8B-B14F-4D97-AF65-F5344CB8AC3E}">
-        <p14:creationId xmlns:p14="http://schemas.microsoft.com/office/powerpoint/2010/main" val="3847048166"/>
-      </p:ext>
-    </p:extLst>
-  </p:cSld>
-  <p:clrMapOvr>
-    <a:masterClrMapping/>
-  </p:clrMapOvr>
-  <mc:AlternateContent xmlns:mc="http://schemas.openxmlformats.org/markup-compatibility/2006" xmlns:p14="http://schemas.microsoft.com/office/powerpoint/2010/main">
-    <mc:Choice Requires="p14">
-      <p:transition spd="med" p14:dur="700">
-        <p:fade/>
-      </p:transition>
-    </mc:Choice>
-    <mc:Fallback xmlns="">
-      <p:transition spd="med">
-        <p:fade/>
-      </p:transition>
-    </mc:Fallback>
-  </mc:AlternateContent>
-</p:sld>
-</file>
-
 <file path=ppt/slides/slide12.xml><?xml version="1.0" encoding="utf-8"?>
 <p:sld xmlns:a="http://schemas.openxmlformats.org/drawingml/2006/main" xmlns:r="http://schemas.openxmlformats.org/officeDocument/2006/relationships" xmlns:p="http://schemas.openxmlformats.org/presentationml/2006/main">
   <p:cSld>
@@ -5606,78 +5570,6 @@
           </a:p>
         </p:txBody>
       </p:sp>
-      <p:pic>
-        <p:nvPicPr>
-          <p:cNvPr id="9" name="그림 8">
-            <a:extLst>
-              <a:ext uri="{FF2B5EF4-FFF2-40B4-BE49-F238E27FC236}">
-                <a16:creationId xmlns:a16="http://schemas.microsoft.com/office/drawing/2014/main" id="{4CD0A3BD-64F1-45A5-ACC6-E3F919D6C82E}"/>
-              </a:ext>
-            </a:extLst>
-          </p:cNvPr>
-          <p:cNvPicPr>
-            <a:picLocks noChangeAspect="1"/>
-          </p:cNvPicPr>
-          <p:nvPr/>
-        </p:nvPicPr>
-        <p:blipFill>
-          <a:blip r:embed="rId3">
-            <a:extLst>
-              <a:ext uri="{28A0092B-C50C-407E-A947-70E740481C1C}">
-                <a14:useLocalDpi xmlns:a14="http://schemas.microsoft.com/office/drawing/2010/main" val="0"/>
-              </a:ext>
-            </a:extLst>
-          </a:blip>
-          <a:stretch>
-            <a:fillRect/>
-          </a:stretch>
-        </p:blipFill>
-        <p:spPr>
-          <a:xfrm>
-            <a:off x="479376" y="308463"/>
-            <a:ext cx="72008" cy="96201"/>
-          </a:xfrm>
-          <a:prstGeom prst="rect">
-            <a:avLst/>
-          </a:prstGeom>
-        </p:spPr>
-      </p:pic>
-      <p:pic>
-        <p:nvPicPr>
-          <p:cNvPr id="10" name="그림 9">
-            <a:extLst>
-              <a:ext uri="{FF2B5EF4-FFF2-40B4-BE49-F238E27FC236}">
-                <a16:creationId xmlns:a16="http://schemas.microsoft.com/office/drawing/2014/main" id="{57619BEE-8269-4915-A63E-2F8BB796D12D}"/>
-              </a:ext>
-            </a:extLst>
-          </p:cNvPr>
-          <p:cNvPicPr>
-            <a:picLocks noChangeAspect="1"/>
-          </p:cNvPicPr>
-          <p:nvPr/>
-        </p:nvPicPr>
-        <p:blipFill>
-          <a:blip r:embed="rId3">
-            <a:extLst>
-              <a:ext uri="{28A0092B-C50C-407E-A947-70E740481C1C}">
-                <a14:useLocalDpi xmlns:a14="http://schemas.microsoft.com/office/drawing/2010/main" val="0"/>
-              </a:ext>
-            </a:extLst>
-          </a:blip>
-          <a:stretch>
-            <a:fillRect/>
-          </a:stretch>
-        </p:blipFill>
-        <p:spPr>
-          <a:xfrm>
-            <a:off x="1" y="6741368"/>
-            <a:ext cx="87301" cy="116632"/>
-          </a:xfrm>
-          <a:prstGeom prst="rect">
-            <a:avLst/>
-          </a:prstGeom>
-        </p:spPr>
-      </p:pic>
       <p:sp>
         <p:nvSpPr>
           <p:cNvPr id="6" name="TextBox 5">
@@ -6427,7 +6319,7 @@
                 <a:latin typeface="나눔고딕" panose="020D0804000000000000" pitchFamily="50" charset="-127"/>
                 <a:ea typeface="나눔고딕" panose="020D0804000000000000" pitchFamily="50" charset="-127"/>
               </a:rPr>
-              <a:t>Intro</a:t>
+              <a:t>Introduction</a:t>
             </a:r>
           </a:p>
           <a:p>
@@ -8042,7 +7934,7 @@
               </a:p>
               <a:p>
                 <a:r>
-                  <a:rPr lang="en-US" altLang="ko-KR" sz="2500" i="1" dirty="0">
+                  <a:rPr lang="en-US" altLang="ko-KR" sz="2500" dirty="0">
                     <a:solidFill>
                       <a:srgbClr val="072A60"/>
                     </a:solidFill>
@@ -8290,7 +8182,7 @@
                 </a:solidFill>
                 <a:latin typeface="Garamond" panose="02020404030301010803" pitchFamily="18" charset="0"/>
               </a:rPr>
-              <a:t>Graphene Phonon Mode</a:t>
+              <a:t>Graphene Phonon Normal Mode</a:t>
             </a:r>
           </a:p>
         </p:txBody>
@@ -8367,8 +8259,8 @@
           </a:prstGeom>
         </p:spPr>
       </p:pic>
-      <mc:AlternateContent xmlns:mc="http://schemas.openxmlformats.org/markup-compatibility/2006" xmlns:a14="http://schemas.microsoft.com/office/drawing/2010/main">
-        <mc:Choice Requires="a14">
+      <mc:AlternateContent xmlns:mc="http://schemas.openxmlformats.org/markup-compatibility/2006">
+        <mc:Choice xmlns:a14="http://schemas.microsoft.com/office/drawing/2010/main" Requires="a14">
           <p:sp>
             <p:nvSpPr>
               <p:cNvPr id="9" name="TextBox 8">
@@ -8404,7 +8296,7 @@
                     </a:solidFill>
                     <a:latin typeface="Garamond" panose="02020404030301010803" pitchFamily="18" charset="0"/>
                   </a:rPr>
-                  <a:t>*</a:t>
+                  <a:t>* </a:t>
                 </a:r>
                 <a14:m>
                   <m:oMath xmlns:m="http://schemas.openxmlformats.org/officeDocument/2006/math">
@@ -8471,7 +8363,7 @@
                     </a:solidFill>
                     <a:latin typeface="Garamond" panose="02020404030301010803" pitchFamily="18" charset="0"/>
                   </a:rPr>
-                  <a:t>*</a:t>
+                  <a:t>* </a:t>
                 </a:r>
                 <a14:m>
                   <m:oMath xmlns:m="http://schemas.openxmlformats.org/officeDocument/2006/math">
@@ -8538,7 +8430,7 @@
                     </a:solidFill>
                     <a:latin typeface="Garamond" panose="02020404030301010803" pitchFamily="18" charset="0"/>
                   </a:rPr>
-                  <a:t>*</a:t>
+                  <a:t>* </a:t>
                 </a:r>
                 <a14:m>
                   <m:oMath xmlns:m="http://schemas.openxmlformats.org/officeDocument/2006/math">
@@ -8605,7 +8497,7 @@
                     </a:solidFill>
                     <a:latin typeface="Garamond" panose="02020404030301010803" pitchFamily="18" charset="0"/>
                   </a:rPr>
-                  <a:t>*</a:t>
+                  <a:t>* </a:t>
                 </a:r>
                 <a14:m>
                   <m:oMath xmlns:m="http://schemas.openxmlformats.org/officeDocument/2006/math">
@@ -8808,7 +8700,7 @@
             </p:txBody>
           </p:sp>
         </mc:Choice>
-        <mc:Fallback xmlns="">
+        <mc:Fallback>
           <p:sp>
             <p:nvSpPr>
               <p:cNvPr id="9" name="TextBox 8">
@@ -9470,6 +9362,123 @@
         </p:nvSpPr>
         <p:spPr>
           <a:xfrm>
+            <a:off x="1442882" y="772006"/>
+            <a:ext cx="10053718" cy="677108"/>
+          </a:xfrm>
+          <a:prstGeom prst="rect">
+            <a:avLst/>
+          </a:prstGeom>
+          <a:noFill/>
+        </p:spPr>
+        <p:txBody>
+          <a:bodyPr wrap="square" rtlCol="0">
+            <a:spAutoFit/>
+          </a:bodyPr>
+          <a:lstStyle/>
+          <a:p>
+            <a:r>
+              <a:rPr lang="en-US" altLang="ko-KR" sz="3800" dirty="0">
+                <a:solidFill>
+                  <a:srgbClr val="072A60"/>
+                </a:solidFill>
+                <a:latin typeface="Garamond" panose="02020404030301010803" pitchFamily="18" charset="0"/>
+              </a:rPr>
+              <a:t>GO, RGO, Graphite – Experiment result</a:t>
+            </a:r>
+          </a:p>
+        </p:txBody>
+      </p:sp>
+      <p:pic>
+        <p:nvPicPr>
+          <p:cNvPr id="11" name="그림 10">
+            <a:extLst>
+              <a:ext uri="{FF2B5EF4-FFF2-40B4-BE49-F238E27FC236}">
+                <a16:creationId xmlns:a16="http://schemas.microsoft.com/office/drawing/2014/main" id="{737BFB5F-2554-280B-814A-9ADC5785CD09}"/>
+              </a:ext>
+            </a:extLst>
+          </p:cNvPr>
+          <p:cNvPicPr>
+            <a:picLocks noChangeAspect="1"/>
+          </p:cNvPicPr>
+          <p:nvPr/>
+        </p:nvPicPr>
+        <p:blipFill rotWithShape="1">
+          <a:blip r:embed="rId2">
+            <a:extLst>
+              <a:ext uri="{28A0092B-C50C-407E-A947-70E740481C1C}">
+                <a14:useLocalDpi xmlns:a14="http://schemas.microsoft.com/office/drawing/2010/main" val="0"/>
+              </a:ext>
+            </a:extLst>
+          </a:blip>
+          <a:srcRect l="2430" b="3626"/>
+          <a:stretch/>
+        </p:blipFill>
+        <p:spPr>
+          <a:xfrm>
+            <a:off x="1055440" y="1628800"/>
+            <a:ext cx="6885366" cy="4680520"/>
+          </a:xfrm>
+          <a:prstGeom prst="rect">
+            <a:avLst/>
+          </a:prstGeom>
+        </p:spPr>
+      </p:pic>
+    </p:spTree>
+    <p:extLst>
+      <p:ext uri="{BB962C8B-B14F-4D97-AF65-F5344CB8AC3E}">
+        <p14:creationId xmlns:p14="http://schemas.microsoft.com/office/powerpoint/2010/main" val="4039343015"/>
+      </p:ext>
+    </p:extLst>
+  </p:cSld>
+  <p:clrMapOvr>
+    <a:masterClrMapping/>
+  </p:clrMapOvr>
+  <mc:AlternateContent xmlns:mc="http://schemas.openxmlformats.org/markup-compatibility/2006" xmlns:p14="http://schemas.microsoft.com/office/powerpoint/2010/main">
+    <mc:Choice Requires="p14">
+      <p:transition spd="med" p14:dur="700">
+        <p:fade/>
+      </p:transition>
+    </mc:Choice>
+    <mc:Fallback xmlns="">
+      <p:transition spd="med">
+        <p:fade/>
+      </p:transition>
+    </mc:Fallback>
+  </mc:AlternateContent>
+</p:sld>
+</file>
+
+<file path=ppt/slides/slide9.xml><?xml version="1.0" encoding="utf-8"?>
+<p:sld xmlns:a="http://schemas.openxmlformats.org/drawingml/2006/main" xmlns:r="http://schemas.openxmlformats.org/officeDocument/2006/relationships" xmlns:p="http://schemas.openxmlformats.org/presentationml/2006/main">
+  <p:cSld>
+    <p:spTree>
+      <p:nvGrpSpPr>
+        <p:cNvPr id="1" name=""/>
+        <p:cNvGrpSpPr/>
+        <p:nvPr/>
+      </p:nvGrpSpPr>
+      <p:grpSpPr>
+        <a:xfrm>
+          <a:off x="0" y="0"/>
+          <a:ext cx="0" cy="0"/>
+          <a:chOff x="0" y="0"/>
+          <a:chExt cx="0" cy="0"/>
+        </a:xfrm>
+      </p:grpSpPr>
+      <p:sp>
+        <p:nvSpPr>
+          <p:cNvPr id="2" name="TextBox 1">
+            <a:extLst>
+              <a:ext uri="{FF2B5EF4-FFF2-40B4-BE49-F238E27FC236}">
+                <a16:creationId xmlns:a16="http://schemas.microsoft.com/office/drawing/2014/main" id="{1A0E440C-C7C9-48AA-EDF9-CAE74E276BA6}"/>
+              </a:ext>
+            </a:extLst>
+          </p:cNvPr>
+          <p:cNvSpPr txBox="1"/>
+          <p:nvPr/>
+        </p:nvSpPr>
+        <p:spPr>
+          <a:xfrm>
             <a:off x="1487488" y="764704"/>
             <a:ext cx="10053718" cy="707886"/>
           </a:xfrm>
@@ -9686,123 +9695,6 @@
     <p:extLst>
       <p:ext uri="{BB962C8B-B14F-4D97-AF65-F5344CB8AC3E}">
         <p14:creationId xmlns:p14="http://schemas.microsoft.com/office/powerpoint/2010/main" val="3747576333"/>
-      </p:ext>
-    </p:extLst>
-  </p:cSld>
-  <p:clrMapOvr>
-    <a:masterClrMapping/>
-  </p:clrMapOvr>
-  <mc:AlternateContent xmlns:mc="http://schemas.openxmlformats.org/markup-compatibility/2006" xmlns:p14="http://schemas.microsoft.com/office/powerpoint/2010/main">
-    <mc:Choice Requires="p14">
-      <p:transition spd="med" p14:dur="700">
-        <p:fade/>
-      </p:transition>
-    </mc:Choice>
-    <mc:Fallback xmlns="">
-      <p:transition spd="med">
-        <p:fade/>
-      </p:transition>
-    </mc:Fallback>
-  </mc:AlternateContent>
-</p:sld>
-</file>
-
-<file path=ppt/slides/slide9.xml><?xml version="1.0" encoding="utf-8"?>
-<p:sld xmlns:a="http://schemas.openxmlformats.org/drawingml/2006/main" xmlns:r="http://schemas.openxmlformats.org/officeDocument/2006/relationships" xmlns:p="http://schemas.openxmlformats.org/presentationml/2006/main">
-  <p:cSld>
-    <p:spTree>
-      <p:nvGrpSpPr>
-        <p:cNvPr id="1" name=""/>
-        <p:cNvGrpSpPr/>
-        <p:nvPr/>
-      </p:nvGrpSpPr>
-      <p:grpSpPr>
-        <a:xfrm>
-          <a:off x="0" y="0"/>
-          <a:ext cx="0" cy="0"/>
-          <a:chOff x="0" y="0"/>
-          <a:chExt cx="0" cy="0"/>
-        </a:xfrm>
-      </p:grpSpPr>
-      <p:sp>
-        <p:nvSpPr>
-          <p:cNvPr id="2" name="TextBox 1">
-            <a:extLst>
-              <a:ext uri="{FF2B5EF4-FFF2-40B4-BE49-F238E27FC236}">
-                <a16:creationId xmlns:a16="http://schemas.microsoft.com/office/drawing/2014/main" id="{1A0E440C-C7C9-48AA-EDF9-CAE74E276BA6}"/>
-              </a:ext>
-            </a:extLst>
-          </p:cNvPr>
-          <p:cNvSpPr txBox="1"/>
-          <p:nvPr/>
-        </p:nvSpPr>
-        <p:spPr>
-          <a:xfrm>
-            <a:off x="1442882" y="772006"/>
-            <a:ext cx="10053718" cy="677108"/>
-          </a:xfrm>
-          <a:prstGeom prst="rect">
-            <a:avLst/>
-          </a:prstGeom>
-          <a:noFill/>
-        </p:spPr>
-        <p:txBody>
-          <a:bodyPr wrap="square" rtlCol="0">
-            <a:spAutoFit/>
-          </a:bodyPr>
-          <a:lstStyle/>
-          <a:p>
-            <a:r>
-              <a:rPr lang="en-US" altLang="ko-KR" sz="3800" dirty="0">
-                <a:solidFill>
-                  <a:srgbClr val="072A60"/>
-                </a:solidFill>
-                <a:latin typeface="Garamond" panose="02020404030301010803" pitchFamily="18" charset="0"/>
-              </a:rPr>
-              <a:t>GO, RGO, Graphite – Experiment result</a:t>
-            </a:r>
-          </a:p>
-        </p:txBody>
-      </p:sp>
-      <p:pic>
-        <p:nvPicPr>
-          <p:cNvPr id="11" name="그림 10">
-            <a:extLst>
-              <a:ext uri="{FF2B5EF4-FFF2-40B4-BE49-F238E27FC236}">
-                <a16:creationId xmlns:a16="http://schemas.microsoft.com/office/drawing/2014/main" id="{737BFB5F-2554-280B-814A-9ADC5785CD09}"/>
-              </a:ext>
-            </a:extLst>
-          </p:cNvPr>
-          <p:cNvPicPr>
-            <a:picLocks noChangeAspect="1"/>
-          </p:cNvPicPr>
-          <p:nvPr/>
-        </p:nvPicPr>
-        <p:blipFill rotWithShape="1">
-          <a:blip r:embed="rId2">
-            <a:extLst>
-              <a:ext uri="{28A0092B-C50C-407E-A947-70E740481C1C}">
-                <a14:useLocalDpi xmlns:a14="http://schemas.microsoft.com/office/drawing/2010/main" val="0"/>
-              </a:ext>
-            </a:extLst>
-          </a:blip>
-          <a:srcRect l="2430" b="3626"/>
-          <a:stretch/>
-        </p:blipFill>
-        <p:spPr>
-          <a:xfrm>
-            <a:off x="1055440" y="1628800"/>
-            <a:ext cx="6885366" cy="4680520"/>
-          </a:xfrm>
-          <a:prstGeom prst="rect">
-            <a:avLst/>
-          </a:prstGeom>
-        </p:spPr>
-      </p:pic>
-    </p:spTree>
-    <p:extLst>
-      <p:ext uri="{BB962C8B-B14F-4D97-AF65-F5344CB8AC3E}">
-        <p14:creationId xmlns:p14="http://schemas.microsoft.com/office/powerpoint/2010/main" val="4039343015"/>
       </p:ext>
     </p:extLst>
   </p:cSld>

</xml_diff>